<commit_message>
figures.pptx with changed screenshot
</commit_message>
<xml_diff>
--- a/Documentation/PR/description/img/figures.pptx
+++ b/Documentation/PR/description/img/figures.pptx
@@ -290,7 +290,8 @@
           <a:p>
             <a:fld id="{5C614250-2AF4-994F-B7F5-226EE8FC2C98}" type="datetimeFigureOut">
               <a:rPr lang="en-US" smtClean="0"/>
-              <a:t>10/31/12</a:t>
+              <a:pPr/>
+              <a:t>11/1/12</a:t>
             </a:fld>
             <a:endParaRPr lang="en-US"/>
           </a:p>
@@ -332,6 +333,7 @@
           <a:p>
             <a:fld id="{9191E8CA-00EC-5040-9F0E-3DFE55E7D038}" type="slidenum">
               <a:rPr lang="en-US" smtClean="0"/>
+              <a:pPr/>
               <a:t>‹#›</a:t>
             </a:fld>
             <a:endParaRPr lang="en-US"/>
@@ -455,7 +457,8 @@
           <a:p>
             <a:fld id="{5C614250-2AF4-994F-B7F5-226EE8FC2C98}" type="datetimeFigureOut">
               <a:rPr lang="en-US" smtClean="0"/>
-              <a:t>10/31/12</a:t>
+              <a:pPr/>
+              <a:t>11/1/12</a:t>
             </a:fld>
             <a:endParaRPr lang="en-US"/>
           </a:p>
@@ -497,6 +500,7 @@
           <a:p>
             <a:fld id="{9191E8CA-00EC-5040-9F0E-3DFE55E7D038}" type="slidenum">
               <a:rPr lang="en-US" smtClean="0"/>
+              <a:pPr/>
               <a:t>‹#›</a:t>
             </a:fld>
             <a:endParaRPr lang="en-US"/>
@@ -630,7 +634,8 @@
           <a:p>
             <a:fld id="{5C614250-2AF4-994F-B7F5-226EE8FC2C98}" type="datetimeFigureOut">
               <a:rPr lang="en-US" smtClean="0"/>
-              <a:t>10/31/12</a:t>
+              <a:pPr/>
+              <a:t>11/1/12</a:t>
             </a:fld>
             <a:endParaRPr lang="en-US"/>
           </a:p>
@@ -672,6 +677,7 @@
           <a:p>
             <a:fld id="{9191E8CA-00EC-5040-9F0E-3DFE55E7D038}" type="slidenum">
               <a:rPr lang="en-US" smtClean="0"/>
+              <a:pPr/>
               <a:t>‹#›</a:t>
             </a:fld>
             <a:endParaRPr lang="en-US"/>
@@ -795,7 +801,8 @@
           <a:p>
             <a:fld id="{5C614250-2AF4-994F-B7F5-226EE8FC2C98}" type="datetimeFigureOut">
               <a:rPr lang="en-US" smtClean="0"/>
-              <a:t>10/31/12</a:t>
+              <a:pPr/>
+              <a:t>11/1/12</a:t>
             </a:fld>
             <a:endParaRPr lang="en-US"/>
           </a:p>
@@ -837,6 +844,7 @@
           <a:p>
             <a:fld id="{9191E8CA-00EC-5040-9F0E-3DFE55E7D038}" type="slidenum">
               <a:rPr lang="en-US" smtClean="0"/>
+              <a:pPr/>
               <a:t>‹#›</a:t>
             </a:fld>
             <a:endParaRPr lang="en-US"/>
@@ -1036,7 +1044,8 @@
           <a:p>
             <a:fld id="{5C614250-2AF4-994F-B7F5-226EE8FC2C98}" type="datetimeFigureOut">
               <a:rPr lang="en-US" smtClean="0"/>
-              <a:t>10/31/12</a:t>
+              <a:pPr/>
+              <a:t>11/1/12</a:t>
             </a:fld>
             <a:endParaRPr lang="en-US"/>
           </a:p>
@@ -1078,6 +1087,7 @@
           <a:p>
             <a:fld id="{9191E8CA-00EC-5040-9F0E-3DFE55E7D038}" type="slidenum">
               <a:rPr lang="en-US" smtClean="0"/>
+              <a:pPr/>
               <a:t>‹#›</a:t>
             </a:fld>
             <a:endParaRPr lang="en-US"/>
@@ -1319,7 +1329,8 @@
           <a:p>
             <a:fld id="{5C614250-2AF4-994F-B7F5-226EE8FC2C98}" type="datetimeFigureOut">
               <a:rPr lang="en-US" smtClean="0"/>
-              <a:t>10/31/12</a:t>
+              <a:pPr/>
+              <a:t>11/1/12</a:t>
             </a:fld>
             <a:endParaRPr lang="en-US"/>
           </a:p>
@@ -1361,6 +1372,7 @@
           <a:p>
             <a:fld id="{9191E8CA-00EC-5040-9F0E-3DFE55E7D038}" type="slidenum">
               <a:rPr lang="en-US" smtClean="0"/>
+              <a:pPr/>
               <a:t>‹#›</a:t>
             </a:fld>
             <a:endParaRPr lang="en-US"/>
@@ -1736,7 +1748,8 @@
           <a:p>
             <a:fld id="{5C614250-2AF4-994F-B7F5-226EE8FC2C98}" type="datetimeFigureOut">
               <a:rPr lang="en-US" smtClean="0"/>
-              <a:t>10/31/12</a:t>
+              <a:pPr/>
+              <a:t>11/1/12</a:t>
             </a:fld>
             <a:endParaRPr lang="en-US"/>
           </a:p>
@@ -1778,6 +1791,7 @@
           <a:p>
             <a:fld id="{9191E8CA-00EC-5040-9F0E-3DFE55E7D038}" type="slidenum">
               <a:rPr lang="en-US" smtClean="0"/>
+              <a:pPr/>
               <a:t>‹#›</a:t>
             </a:fld>
             <a:endParaRPr lang="en-US"/>
@@ -1849,7 +1863,8 @@
           <a:p>
             <a:fld id="{5C614250-2AF4-994F-B7F5-226EE8FC2C98}" type="datetimeFigureOut">
               <a:rPr lang="en-US" smtClean="0"/>
-              <a:t>10/31/12</a:t>
+              <a:pPr/>
+              <a:t>11/1/12</a:t>
             </a:fld>
             <a:endParaRPr lang="en-US"/>
           </a:p>
@@ -1891,6 +1906,7 @@
           <a:p>
             <a:fld id="{9191E8CA-00EC-5040-9F0E-3DFE55E7D038}" type="slidenum">
               <a:rPr lang="en-US" smtClean="0"/>
+              <a:pPr/>
               <a:t>‹#›</a:t>
             </a:fld>
             <a:endParaRPr lang="en-US"/>
@@ -1939,7 +1955,8 @@
           <a:p>
             <a:fld id="{5C614250-2AF4-994F-B7F5-226EE8FC2C98}" type="datetimeFigureOut">
               <a:rPr lang="en-US" smtClean="0"/>
-              <a:t>10/31/12</a:t>
+              <a:pPr/>
+              <a:t>11/1/12</a:t>
             </a:fld>
             <a:endParaRPr lang="en-US"/>
           </a:p>
@@ -1981,6 +1998,7 @@
           <a:p>
             <a:fld id="{9191E8CA-00EC-5040-9F0E-3DFE55E7D038}" type="slidenum">
               <a:rPr lang="en-US" smtClean="0"/>
+              <a:pPr/>
               <a:t>‹#›</a:t>
             </a:fld>
             <a:endParaRPr lang="en-US"/>
@@ -2211,7 +2229,8 @@
           <a:p>
             <a:fld id="{5C614250-2AF4-994F-B7F5-226EE8FC2C98}" type="datetimeFigureOut">
               <a:rPr lang="en-US" smtClean="0"/>
-              <a:t>10/31/12</a:t>
+              <a:pPr/>
+              <a:t>11/1/12</a:t>
             </a:fld>
             <a:endParaRPr lang="en-US"/>
           </a:p>
@@ -2253,6 +2272,7 @@
           <a:p>
             <a:fld id="{9191E8CA-00EC-5040-9F0E-3DFE55E7D038}" type="slidenum">
               <a:rPr lang="en-US" smtClean="0"/>
+              <a:pPr/>
               <a:t>‹#›</a:t>
             </a:fld>
             <a:endParaRPr lang="en-US"/>
@@ -2459,7 +2479,8 @@
           <a:p>
             <a:fld id="{5C614250-2AF4-994F-B7F5-226EE8FC2C98}" type="datetimeFigureOut">
               <a:rPr lang="en-US" smtClean="0"/>
-              <a:t>10/31/12</a:t>
+              <a:pPr/>
+              <a:t>11/1/12</a:t>
             </a:fld>
             <a:endParaRPr lang="en-US"/>
           </a:p>
@@ -2501,6 +2522,7 @@
           <a:p>
             <a:fld id="{9191E8CA-00EC-5040-9F0E-3DFE55E7D038}" type="slidenum">
               <a:rPr lang="en-US" smtClean="0"/>
+              <a:pPr/>
               <a:t>‹#›</a:t>
             </a:fld>
             <a:endParaRPr lang="en-US"/>
@@ -2667,7 +2689,8 @@
           <a:p>
             <a:fld id="{5C614250-2AF4-994F-B7F5-226EE8FC2C98}" type="datetimeFigureOut">
               <a:rPr lang="en-US" smtClean="0"/>
-              <a:t>10/31/12</a:t>
+              <a:pPr/>
+              <a:t>11/1/12</a:t>
             </a:fld>
             <a:endParaRPr lang="en-US"/>
           </a:p>
@@ -2745,6 +2768,7 @@
           <a:p>
             <a:fld id="{9191E8CA-00EC-5040-9F0E-3DFE55E7D038}" type="slidenum">
               <a:rPr lang="en-US" smtClean="0"/>
+              <a:pPr/>
               <a:t>‹#›</a:t>
             </a:fld>
             <a:endParaRPr lang="en-US"/>
@@ -3077,7 +3101,7 @@
         </p:blipFill>
         <p:spPr>
           <a:xfrm>
-            <a:off x="895667" y="1369791"/>
+            <a:off x="4025830" y="1369791"/>
             <a:ext cx="3400396" cy="2592000"/>
           </a:xfrm>
           <a:prstGeom prst="rect">

</xml_diff>

<commit_message>
make it fit into 4 pages again, adjust the screenshot
</commit_message>
<xml_diff>
--- a/Documentation/PR/description/img/figures.pptx
+++ b/Documentation/PR/description/img/figures.pptx
@@ -291,7 +291,7 @@
             <a:fld id="{5C614250-2AF4-994F-B7F5-226EE8FC2C98}" type="datetimeFigureOut">
               <a:rPr lang="en-US" smtClean="0"/>
               <a:pPr/>
-              <a:t>11/1/12</a:t>
+              <a:t>11/2/12</a:t>
             </a:fld>
             <a:endParaRPr lang="en-US"/>
           </a:p>
@@ -458,7 +458,7 @@
             <a:fld id="{5C614250-2AF4-994F-B7F5-226EE8FC2C98}" type="datetimeFigureOut">
               <a:rPr lang="en-US" smtClean="0"/>
               <a:pPr/>
-              <a:t>11/1/12</a:t>
+              <a:t>11/2/12</a:t>
             </a:fld>
             <a:endParaRPr lang="en-US"/>
           </a:p>
@@ -635,7 +635,7 @@
             <a:fld id="{5C614250-2AF4-994F-B7F5-226EE8FC2C98}" type="datetimeFigureOut">
               <a:rPr lang="en-US" smtClean="0"/>
               <a:pPr/>
-              <a:t>11/1/12</a:t>
+              <a:t>11/2/12</a:t>
             </a:fld>
             <a:endParaRPr lang="en-US"/>
           </a:p>
@@ -802,7 +802,7 @@
             <a:fld id="{5C614250-2AF4-994F-B7F5-226EE8FC2C98}" type="datetimeFigureOut">
               <a:rPr lang="en-US" smtClean="0"/>
               <a:pPr/>
-              <a:t>11/1/12</a:t>
+              <a:t>11/2/12</a:t>
             </a:fld>
             <a:endParaRPr lang="en-US"/>
           </a:p>
@@ -1045,7 +1045,7 @@
             <a:fld id="{5C614250-2AF4-994F-B7F5-226EE8FC2C98}" type="datetimeFigureOut">
               <a:rPr lang="en-US" smtClean="0"/>
               <a:pPr/>
-              <a:t>11/1/12</a:t>
+              <a:t>11/2/12</a:t>
             </a:fld>
             <a:endParaRPr lang="en-US"/>
           </a:p>
@@ -1330,7 +1330,7 @@
             <a:fld id="{5C614250-2AF4-994F-B7F5-226EE8FC2C98}" type="datetimeFigureOut">
               <a:rPr lang="en-US" smtClean="0"/>
               <a:pPr/>
-              <a:t>11/1/12</a:t>
+              <a:t>11/2/12</a:t>
             </a:fld>
             <a:endParaRPr lang="en-US"/>
           </a:p>
@@ -1749,7 +1749,7 @@
             <a:fld id="{5C614250-2AF4-994F-B7F5-226EE8FC2C98}" type="datetimeFigureOut">
               <a:rPr lang="en-US" smtClean="0"/>
               <a:pPr/>
-              <a:t>11/1/12</a:t>
+              <a:t>11/2/12</a:t>
             </a:fld>
             <a:endParaRPr lang="en-US"/>
           </a:p>
@@ -1864,7 +1864,7 @@
             <a:fld id="{5C614250-2AF4-994F-B7F5-226EE8FC2C98}" type="datetimeFigureOut">
               <a:rPr lang="en-US" smtClean="0"/>
               <a:pPr/>
-              <a:t>11/1/12</a:t>
+              <a:t>11/2/12</a:t>
             </a:fld>
             <a:endParaRPr lang="en-US"/>
           </a:p>
@@ -1956,7 +1956,7 @@
             <a:fld id="{5C614250-2AF4-994F-B7F5-226EE8FC2C98}" type="datetimeFigureOut">
               <a:rPr lang="en-US" smtClean="0"/>
               <a:pPr/>
-              <a:t>11/1/12</a:t>
+              <a:t>11/2/12</a:t>
             </a:fld>
             <a:endParaRPr lang="en-US"/>
           </a:p>
@@ -2230,7 +2230,7 @@
             <a:fld id="{5C614250-2AF4-994F-B7F5-226EE8FC2C98}" type="datetimeFigureOut">
               <a:rPr lang="en-US" smtClean="0"/>
               <a:pPr/>
-              <a:t>11/1/12</a:t>
+              <a:t>11/2/12</a:t>
             </a:fld>
             <a:endParaRPr lang="en-US"/>
           </a:p>
@@ -2480,7 +2480,7 @@
             <a:fld id="{5C614250-2AF4-994F-B7F5-226EE8FC2C98}" type="datetimeFigureOut">
               <a:rPr lang="en-US" smtClean="0"/>
               <a:pPr/>
-              <a:t>11/1/12</a:t>
+              <a:t>11/2/12</a:t>
             </a:fld>
             <a:endParaRPr lang="en-US"/>
           </a:p>
@@ -2690,7 +2690,7 @@
             <a:fld id="{5C614250-2AF4-994F-B7F5-226EE8FC2C98}" type="datetimeFigureOut">
               <a:rPr lang="en-US" smtClean="0"/>
               <a:pPr/>
-              <a:t>11/1/12</a:t>
+              <a:t>11/2/12</a:t>
             </a:fld>
             <a:endParaRPr lang="en-US"/>
           </a:p>
@@ -3063,7 +3063,7 @@
       </p:grpSpPr>
       <p:pic>
         <p:nvPicPr>
-          <p:cNvPr id="6" name="Picture 5"/>
+          <p:cNvPr id="16" name="Picture 15"/>
           <p:cNvPicPr>
             <a:picLocks noChangeAspect="1"/>
           </p:cNvPicPr>
@@ -3077,8 +3077,8 @@
         </p:blipFill>
         <p:spPr>
           <a:xfrm>
-            <a:off x="-424672" y="2220136"/>
-            <a:ext cx="10063136" cy="3240000"/>
+            <a:off x="-38100" y="570665"/>
+            <a:ext cx="2578100" cy="4102100"/>
           </a:xfrm>
           <a:prstGeom prst="rect">
             <a:avLst/>
@@ -3087,7 +3087,7 @@
       </p:pic>
       <p:pic>
         <p:nvPicPr>
-          <p:cNvPr id="7" name="Picture 6"/>
+          <p:cNvPr id="17" name="Picture 16"/>
           <p:cNvPicPr>
             <a:picLocks noChangeAspect="1"/>
           </p:cNvPicPr>
@@ -3101,14 +3101,38 @@
         </p:blipFill>
         <p:spPr>
           <a:xfrm>
-            <a:off x="4025830" y="1369791"/>
-            <a:ext cx="3400396" cy="2592000"/>
+            <a:off x="2540000" y="570665"/>
+            <a:ext cx="13208000" cy="4114800"/>
+          </a:xfrm>
+          <a:prstGeom prst="rect">
+            <a:avLst/>
+          </a:prstGeom>
+        </p:spPr>
+      </p:pic>
+      <p:pic>
+        <p:nvPicPr>
+          <p:cNvPr id="19" name="Picture 18"/>
+          <p:cNvPicPr>
+            <a:picLocks noChangeAspect="1"/>
+          </p:cNvPicPr>
+          <p:nvPr/>
+        </p:nvPicPr>
+        <p:blipFill>
+          <a:blip r:embed="rId4"/>
+          <a:stretch>
+            <a:fillRect/>
+          </a:stretch>
+        </p:blipFill>
+        <p:spPr>
+          <a:xfrm>
+            <a:off x="8682231" y="3009900"/>
+            <a:ext cx="5600700" cy="3848100"/>
           </a:xfrm>
           <a:prstGeom prst="rect">
             <a:avLst/>
           </a:prstGeom>
           <a:effectLst>
-            <a:outerShdw blurRad="50800" dist="38100" dir="2700000" algn="tl" rotWithShape="0">
+            <a:outerShdw blurRad="469900" dist="38100" dir="2700000" sx="102000" sy="102000" algn="tl" rotWithShape="0">
               <a:srgbClr val="000000">
                 <a:alpha val="43000"/>
               </a:srgbClr>

</xml_diff>

<commit_message>
forgot to save pptx. Now ready for submission!
</commit_message>
<xml_diff>
--- a/Documentation/PR/description/img/figures.pptx
+++ b/Documentation/PR/description/img/figures.pptx
@@ -3119,25 +3119,20 @@
         </p:nvPicPr>
         <p:blipFill>
           <a:blip r:embed="rId4"/>
+          <a:srcRect l="643" t="936"/>
           <a:stretch>
             <a:fillRect/>
           </a:stretch>
         </p:blipFill>
         <p:spPr>
           <a:xfrm>
-            <a:off x="8682231" y="3009900"/>
-            <a:ext cx="5600700" cy="3848100"/>
+            <a:off x="8801100" y="2995017"/>
+            <a:ext cx="5564700" cy="3812183"/>
           </a:xfrm>
           <a:prstGeom prst="rect">
             <a:avLst/>
           </a:prstGeom>
-          <a:effectLst>
-            <a:outerShdw blurRad="469900" dist="38100" dir="2700000" sx="102000" sy="102000" algn="tl" rotWithShape="0">
-              <a:srgbClr val="000000">
-                <a:alpha val="43000"/>
-              </a:srgbClr>
-            </a:outerShdw>
-          </a:effectLst>
+          <a:effectLst/>
         </p:spPr>
       </p:pic>
     </p:spTree>

</xml_diff>